<commit_message>
adding feb 22 slides
</commit_message>
<xml_diff>
--- a/slides/feb17.pptx
+++ b/slides/feb17.pptx
@@ -36410,7 +36410,7 @@
           <a:p>
             <a:r>
               <a:rPr lang="en-US" dirty="0"/>
-              <a:t>Affect Control Theory</a:t>
+              <a:t>Affect Control Theory: Relabeling</a:t>
             </a:r>
           </a:p>
         </p:txBody>
@@ -36438,7 +36438,7 @@
           <a:p>
             <a:r>
               <a:rPr lang="en-US" dirty="0"/>
-              <a:t>Relabeling</a:t>
+              <a:t>Feb 17, 2023</a:t>
             </a:r>
           </a:p>
         </p:txBody>
@@ -37262,10 +37262,7 @@
           <a:bodyPr/>
           <a:lstStyle/>
           <a:p>
-            <a:r>
-              <a:rPr lang="en-US" dirty="0"/>
-              <a:t>Discussion</a:t>
-            </a:r>
+            <a:endParaRPr lang="en-US" dirty="0"/>
           </a:p>
         </p:txBody>
       </p:sp>

</xml_diff>